<commit_message>
modification of the ppt
</commit_message>
<xml_diff>
--- a/your-project/Final Project/Presentation & Eco insights/Copper, A New Economic Estimator ?.pptx
+++ b/your-project/Final Project/Presentation & Eco insights/Copper, A New Economic Estimator ?.pptx
@@ -4878,7 +4878,7 @@
             </a:br>
             <a:r>
               <a:rPr lang="en-AU" dirty="0"/>
-              <a:t>data SOURCE</a:t>
+              <a:t>PARAMETERS</a:t>
             </a:r>
             <a:br>
               <a:rPr lang="en-AU" dirty="0"/>
@@ -4915,52 +4915,43 @@
           </a:bodyPr>
           <a:lstStyle/>
           <a:p>
-            <a:r>
-              <a:rPr lang="en-AU" b="1" i="1" u="sng" dirty="0"/>
-              <a:t>WHAT I LOOKED FOR:</a:t>
-            </a:r>
+            <a:pPr marL="0" indent="0" algn="ctr">
+              <a:buNone/>
+            </a:pPr>
             <a:r>
               <a:rPr lang="en-AU" dirty="0"/>
-              <a:t>                                                                                      </a:t>
-            </a:r>
-            <a:r>
-              <a:rPr lang="en-AU" b="1" i="1" u="sng" dirty="0"/>
-              <a:t>DATA SOURCE:</a:t>
-            </a:r>
-          </a:p>
-          <a:p>
-            <a:pPr marL="0" indent="0">
+              <a:t>						</a:t>
+            </a:r>
+            <a:r>
+              <a:rPr lang="en-AU" sz="1800" dirty="0"/>
+              <a:t>-THE EVOLUTION OF THE PRICE OF COPPER… 						</a:t>
+            </a:r>
+          </a:p>
+          <a:p>
+            <a:pPr marL="0" indent="0" algn="ctr">
               <a:buNone/>
             </a:pPr>
-            <a:endParaRPr lang="en-AU" b="1" i="1" u="sng" dirty="0"/>
-          </a:p>
-          <a:p>
-            <a:pPr marL="0" indent="0">
+            <a:r>
+              <a:rPr lang="en-AU" sz="1800" dirty="0"/>
+              <a:t> - GDP</a:t>
+            </a:r>
+          </a:p>
+          <a:p>
+            <a:pPr marL="0" indent="0" algn="ctr">
               <a:buNone/>
             </a:pPr>
             <a:r>
-              <a:rPr lang="en-AU" dirty="0"/>
-              <a:t>-THE EVOLUTION OF THE PRICE OF COPPER… 						- US FEDERAL RESERVE</a:t>
-            </a:r>
-          </a:p>
-          <a:p>
-            <a:pPr lvl="8">
-              <a:buFontTx/>
-              <a:buChar char="-"/>
+              <a:rPr lang="en-AU" sz="1800" dirty="0"/>
+              <a:t> - YIELD CURVE </a:t>
+            </a:r>
+          </a:p>
+          <a:p>
+            <a:pPr marL="0" indent="0" algn="ctr">
+              <a:buNone/>
             </a:pPr>
             <a:r>
               <a:rPr lang="en-AU" sz="1800" dirty="0"/>
-              <a:t>                                                                       - OECD</a:t>
-            </a:r>
-            <a:endParaRPr lang="en-AU" dirty="0"/>
-          </a:p>
-          <a:p>
-            <a:pPr marL="0" indent="0">
-              <a:buNone/>
-            </a:pPr>
-            <a:r>
-              <a:rPr lang="en-AU" dirty="0"/>
-              <a:t>- ECONOMIC ESTIMATORS ( GDP, YIELD CURVE, CCI…)					-  WORLD BANK</a:t>
+              <a:t>-  CONSUMER CONFIDENCE INDEX (CCI)</a:t>
             </a:r>
           </a:p>
         </p:txBody>
@@ -5013,10 +5004,23 @@
         </p:nvSpPr>
         <p:spPr/>
         <p:txBody>
-          <a:bodyPr/>
-          <a:lstStyle/>
-          <a:p>
-            <a:endParaRPr lang="en-AU"/>
+          <a:bodyPr>
+            <a:normAutofit fontScale="90000"/>
+          </a:bodyPr>
+          <a:lstStyle/>
+          <a:p>
+            <a:pPr algn="ctr"/>
+            <a:br>
+              <a:rPr lang="en-AU" dirty="0"/>
+            </a:br>
+            <a:r>
+              <a:rPr lang="en-AU" dirty="0"/>
+              <a:t>data SOURCE</a:t>
+            </a:r>
+            <a:br>
+              <a:rPr lang="en-AU" dirty="0"/>
+            </a:br>
+            <a:endParaRPr lang="en-AU" dirty="0"/>
           </a:p>
         </p:txBody>
       </p:sp>
@@ -5044,7 +5048,7 @@
         </p:blipFill>
         <p:spPr>
           <a:xfrm>
-            <a:off x="1487315" y="1297077"/>
+            <a:off x="1080122" y="1939131"/>
             <a:ext cx="2660480" cy="1489869"/>
           </a:xfrm>
           <a:prstGeom prst="rect">
@@ -5074,7 +5078,7 @@
         </p:blipFill>
         <p:spPr>
           <a:xfrm>
-            <a:off x="1080122" y="3890666"/>
+            <a:off x="1795230" y="4314572"/>
             <a:ext cx="3474866" cy="1622469"/>
           </a:xfrm>
           <a:prstGeom prst="rect">
@@ -5104,7 +5108,7 @@
         </p:blipFill>
         <p:spPr>
           <a:xfrm>
-            <a:off x="6574183" y="4157940"/>
+            <a:off x="7476860" y="4314572"/>
             <a:ext cx="2397125" cy="2397125"/>
           </a:xfrm>
           <a:prstGeom prst="rect">
@@ -5134,7 +5138,7 @@
         </p:blipFill>
         <p:spPr>
           <a:xfrm>
-            <a:off x="7293148" y="1431096"/>
+            <a:off x="8078594" y="1685113"/>
             <a:ext cx="2868612" cy="1997904"/>
           </a:xfrm>
           <a:prstGeom prst="rect">

</xml_diff>

<commit_message>
small modifiactions in the presentation
</commit_message>
<xml_diff>
--- a/your-project/Final Project/Presentation & Eco insights/Copper, A New Economic Estimator ?.pptx
+++ b/your-project/Final Project/Presentation & Eco insights/Copper, A New Economic Estimator ?.pptx
@@ -5770,11 +5770,11 @@
             </a:r>
             <a:r>
               <a:rPr lang="en-AU" b="1" dirty="0"/>
-              <a:t>78%</a:t>
-            </a:r>
-            <a:r>
-              <a:rPr lang="en-AU" dirty="0"/>
-              <a:t> ON THE F1 SCORE &amp; </a:t>
+              <a:t>78% </a:t>
+            </a:r>
+            <a:r>
+              <a:rPr lang="en-AU" dirty="0"/>
+              <a:t>ON THE F1 SCORE &amp; </a:t>
             </a:r>
             <a:r>
               <a:rPr lang="en-AU" b="1" dirty="0"/>
@@ -5804,7 +5804,23 @@
             </a:r>
             <a:r>
               <a:rPr lang="en-AU" dirty="0"/>
-              <a:t>: 73% ON THE F1 SCORE &amp; 81 % ACCURACY ON PREDICTING VALUES</a:t>
+              <a:t>: </a:t>
+            </a:r>
+            <a:r>
+              <a:rPr lang="en-AU" b="1" dirty="0"/>
+              <a:t>73%</a:t>
+            </a:r>
+            <a:r>
+              <a:rPr lang="en-AU" dirty="0"/>
+              <a:t> ON THE F1 SCORE &amp; </a:t>
+            </a:r>
+            <a:r>
+              <a:rPr lang="en-AU" b="1" dirty="0"/>
+              <a:t>81 % </a:t>
+            </a:r>
+            <a:r>
+              <a:rPr lang="en-AU" dirty="0"/>
+              <a:t>ACCURACY ON PREDICTING VALUES</a:t>
             </a:r>
           </a:p>
           <a:p>

</xml_diff>